<commit_message>
added some work from this morning
</commit_message>
<xml_diff>
--- a/Kochanek_projekt_II_it_use_liability.pptx
+++ b/Kochanek_projekt_II_it_use_liability.pptx
@@ -220,7 +220,7 @@
           <a:p>
             <a:fld id="{BBE73205-81ED-456F-9C45-E7D4927D1E88}" type="datetimeFigureOut">
               <a:rPr lang="cs-CZ" smtClean="0"/>
-              <a:t>27.05.2022</a:t>
+              <a:t>29.05.2022</a:t>
             </a:fld>
             <a:endParaRPr lang="cs-CZ"/>
           </a:p>
@@ -2768,6 +2768,44 @@
               </a:rPr>
               <a:t>Zákon o kybernetické bezpečnosti nezakládá civilní ani trestní odpovědnost pachatelů kybernetických útoků, ale vytváří systém bezpečnostních opatření, která mají výskytu kybernetických bezpečnostních incidentů předcházet</a:t>
             </a:r>
+            <a:r>
+              <a:rPr lang="en-US" b="0" dirty="0">
+                <a:effectLst/>
+                <a:latin typeface="+mn-lt"/>
+              </a:rPr>
+              <a:t>.</a:t>
+            </a:r>
+          </a:p>
+          <a:p>
+            <a:r>
+              <a:rPr lang="en-US" b="0" dirty="0" err="1">
+                <a:effectLst/>
+                <a:latin typeface="+mn-lt"/>
+              </a:rPr>
+              <a:t>ZoKB</a:t>
+            </a:r>
+            <a:r>
+              <a:rPr lang="en-US" b="0" dirty="0">
+                <a:effectLst/>
+                <a:latin typeface="+mn-lt"/>
+              </a:rPr>
+              <a:t> d</a:t>
+            </a:r>
+            <a:r>
+              <a:rPr lang="cs-CZ" b="0" dirty="0" err="1">
+                <a:effectLst/>
+                <a:latin typeface="+mn-lt"/>
+              </a:rPr>
+              <a:t>ále</a:t>
+            </a:r>
+            <a:r>
+              <a:rPr lang="cs-CZ" dirty="0">
+                <a:latin typeface="+mn-lt"/>
+              </a:rPr>
+              <a:t> popisuje jen významné nebo kritické prvky informační infrastruktury.</a:t>
+            </a:r>
+          </a:p>
+          <a:p>
             <a:endParaRPr lang="en-US" b="0" dirty="0">
               <a:effectLst/>
               <a:latin typeface="+mn-lt"/>
@@ -2905,6 +2943,38 @@
               </a:rPr>
               <a:t>ý. Zákon o kybernetické bezpečnosti výhradně upravuje větší  NÚKIB vydá varování o existenci hrozby v oblasti KB, na kterou je nutné bezprostředně reagovat.</a:t>
             </a:r>
+          </a:p>
+          <a:p>
+            <a:endParaRPr lang="cs-CZ" b="0" dirty="0">
+              <a:effectLst/>
+              <a:latin typeface="+mn-lt"/>
+            </a:endParaRPr>
+          </a:p>
+          <a:p>
+            <a:r>
+              <a:rPr lang="cs-CZ" dirty="0">
+                <a:latin typeface="+mn-lt"/>
+              </a:rPr>
+              <a:t>Běžný uživatel, který se nenachází v pozici pracovníka významné nebo kritické </a:t>
+            </a:r>
+            <a:r>
+              <a:rPr lang="cs-CZ" dirty="0" err="1">
+                <a:latin typeface="+mn-lt"/>
+              </a:rPr>
+              <a:t>síťe</a:t>
+            </a:r>
+            <a:r>
+              <a:rPr lang="cs-CZ" dirty="0">
+                <a:latin typeface="+mn-lt"/>
+              </a:rPr>
+              <a:t> elektronických komunikací nebo informačního systému nemusí dodržovat varování od úřadu varování a nebude za to trestán.</a:t>
+            </a:r>
+          </a:p>
+          <a:p>
+            <a:endParaRPr lang="cs-CZ" b="0" dirty="0">
+              <a:effectLst/>
+              <a:latin typeface="+mn-lt"/>
+            </a:endParaRPr>
           </a:p>
           <a:p>
             <a:endParaRPr lang="cs-CZ" b="0" dirty="0">

</xml_diff>

<commit_message>
working from bed day before presentation
</commit_message>
<xml_diff>
--- a/Kochanek_projekt_II_it_use_liability.pptx
+++ b/Kochanek_projekt_II_it_use_liability.pptx
@@ -5,19 +5,18 @@
     <p:sldMasterId id="2147483660" r:id="rId1"/>
   </p:sldMasterIdLst>
   <p:notesMasterIdLst>
-    <p:notesMasterId r:id="rId12"/>
+    <p:notesMasterId r:id="rId11"/>
   </p:notesMasterIdLst>
   <p:sldIdLst>
     <p:sldId id="256" r:id="rId2"/>
     <p:sldId id="257" r:id="rId3"/>
     <p:sldId id="269" r:id="rId4"/>
     <p:sldId id="267" r:id="rId5"/>
-    <p:sldId id="270" r:id="rId6"/>
-    <p:sldId id="271" r:id="rId7"/>
-    <p:sldId id="272" r:id="rId8"/>
-    <p:sldId id="273" r:id="rId9"/>
-    <p:sldId id="268" r:id="rId10"/>
-    <p:sldId id="261" r:id="rId11"/>
+    <p:sldId id="271" r:id="rId6"/>
+    <p:sldId id="272" r:id="rId7"/>
+    <p:sldId id="273" r:id="rId8"/>
+    <p:sldId id="268" r:id="rId9"/>
+    <p:sldId id="261" r:id="rId10"/>
   </p:sldIdLst>
   <p:sldSz cx="12192000" cy="6858000"/>
   <p:notesSz cx="6858000" cy="9144000"/>
@@ -220,7 +219,7 @@
           <a:p>
             <a:fld id="{BBE73205-81ED-456F-9C45-E7D4927D1E88}" type="datetimeFigureOut">
               <a:rPr lang="cs-CZ" smtClean="0"/>
-              <a:t>29.05.2022</a:t>
+              <a:t>01.06.2022</a:t>
             </a:fld>
             <a:endParaRPr lang="cs-CZ"/>
           </a:p>
@@ -1832,129 +1831,6 @@
 </p:sld>
 </file>
 
-<file path=ppt/slides/slide10.xml><?xml version="1.0" encoding="utf-8"?>
-<p:sld xmlns:a="http://schemas.openxmlformats.org/drawingml/2006/main" xmlns:r="http://schemas.openxmlformats.org/officeDocument/2006/relationships" xmlns:p="http://schemas.openxmlformats.org/presentationml/2006/main">
-  <p:cSld>
-    <p:spTree>
-      <p:nvGrpSpPr>
-        <p:cNvPr id="1" name=""/>
-        <p:cNvGrpSpPr/>
-        <p:nvPr/>
-      </p:nvGrpSpPr>
-      <p:grpSpPr>
-        <a:xfrm>
-          <a:off x="0" y="0"/>
-          <a:ext cx="0" cy="0"/>
-          <a:chOff x="0" y="0"/>
-          <a:chExt cx="0" cy="0"/>
-        </a:xfrm>
-      </p:grpSpPr>
-      <p:sp>
-        <p:nvSpPr>
-          <p:cNvPr id="2" name="Nadpis 1">
-            <a:extLst>
-              <a:ext uri="{FF2B5EF4-FFF2-40B4-BE49-F238E27FC236}">
-                <a16:creationId xmlns:a16="http://schemas.microsoft.com/office/drawing/2014/main" id="{4AD65151-25F6-4CAA-8F2F-583CC6D94A46}"/>
-              </a:ext>
-            </a:extLst>
-          </p:cNvPr>
-          <p:cNvSpPr>
-            <a:spLocks noGrp="1"/>
-          </p:cNvSpPr>
-          <p:nvPr>
-            <p:ph type="title"/>
-          </p:nvPr>
-        </p:nvSpPr>
-        <p:spPr/>
-        <p:txBody>
-          <a:bodyPr/>
-          <a:lstStyle/>
-          <a:p>
-            <a:r>
-              <a:rPr lang="cs-CZ">
-                <a:cs typeface="Calibri Light"/>
-              </a:rPr>
-              <a:t>Zdroje</a:t>
-            </a:r>
-          </a:p>
-        </p:txBody>
-      </p:sp>
-      <p:sp>
-        <p:nvSpPr>
-          <p:cNvPr id="3" name="Zástupný obsah 2">
-            <a:extLst>
-              <a:ext uri="{FF2B5EF4-FFF2-40B4-BE49-F238E27FC236}">
-                <a16:creationId xmlns:a16="http://schemas.microsoft.com/office/drawing/2014/main" id="{53BD2864-2797-45C9-BA46-310944DCC4E3}"/>
-              </a:ext>
-            </a:extLst>
-          </p:cNvPr>
-          <p:cNvSpPr>
-            <a:spLocks noGrp="1"/>
-          </p:cNvSpPr>
-          <p:nvPr>
-            <p:ph idx="1"/>
-          </p:nvPr>
-        </p:nvSpPr>
-        <p:spPr/>
-        <p:txBody>
-          <a:bodyPr vert="horz" lIns="91440" tIns="45720" rIns="91440" bIns="45720" rtlCol="0" anchor="t">
-            <a:normAutofit/>
-          </a:bodyPr>
-          <a:lstStyle/>
-          <a:p>
-            <a:r>
-              <a:rPr lang="cs-CZ" dirty="0">
-                <a:ea typeface="+mn-lt"/>
-                <a:cs typeface="+mn-lt"/>
-              </a:rPr>
-              <a:t>https://www.policie.cz/</a:t>
-            </a:r>
-            <a:r>
-              <a:rPr lang="cs-CZ" dirty="0" err="1">
-                <a:ea typeface="+mn-lt"/>
-                <a:cs typeface="+mn-lt"/>
-              </a:rPr>
-              <a:t>clanek</a:t>
-            </a:r>
-            <a:r>
-              <a:rPr lang="cs-CZ" dirty="0">
-                <a:ea typeface="+mn-lt"/>
-                <a:cs typeface="+mn-lt"/>
-              </a:rPr>
-              <a:t>/jednotlive-druhy-kyberkriminality.aspx#:~:text=Neopr%C3%A1vn%C4%9Bn%C3%BD%20p%C5%99%C3%ADstup%20k%20po%C4%8D%C3%ADta%C4%8Dov%C3%A9mu%20syst%C3%A9mu,neposledn%C3%AD%20%C5%99ad%C4%9B%20i%20zneu%C5%BE%C3%ADv%C3%A1n%C3%AD%20za%C5%99%C3%ADzen%C3%AD.</a:t>
-            </a:r>
-            <a:endParaRPr lang="en-US" dirty="0">
-              <a:ea typeface="+mn-lt"/>
-              <a:cs typeface="+mn-lt"/>
-            </a:endParaRPr>
-          </a:p>
-          <a:p>
-            <a:endParaRPr lang="en-US" dirty="0">
-              <a:ea typeface="+mn-lt"/>
-              <a:cs typeface="+mn-lt"/>
-            </a:endParaRPr>
-          </a:p>
-          <a:p>
-            <a:endParaRPr lang="cs-CZ" dirty="0">
-              <a:ea typeface="+mn-lt"/>
-              <a:cs typeface="+mn-lt"/>
-            </a:endParaRPr>
-          </a:p>
-        </p:txBody>
-      </p:sp>
-    </p:spTree>
-    <p:extLst>
-      <p:ext uri="{BB962C8B-B14F-4D97-AF65-F5344CB8AC3E}">
-        <p14:creationId xmlns:p14="http://schemas.microsoft.com/office/powerpoint/2010/main" val="1594678827"/>
-      </p:ext>
-    </p:extLst>
-  </p:cSld>
-  <p:clrMapOvr>
-    <a:masterClrMapping/>
-  </p:clrMapOvr>
-</p:sld>
-</file>
-
 <file path=ppt/slides/slide2.xml><?xml version="1.0" encoding="utf-8"?>
 <p:sld xmlns:a="http://schemas.openxmlformats.org/drawingml/2006/main" xmlns:r="http://schemas.openxmlformats.org/officeDocument/2006/relationships" xmlns:p="http://schemas.openxmlformats.org/presentationml/2006/main">
   <p:cSld>
@@ -2227,6 +2103,19 @@
               </a:rPr>
               <a:t> </a:t>
             </a:r>
+          </a:p>
+          <a:p>
+            <a:pPr marL="102870" algn="just">
+              <a:spcBef>
+                <a:spcPts val="490"/>
+              </a:spcBef>
+              <a:spcAft>
+                <a:spcPts val="0"/>
+              </a:spcAft>
+              <a:tabLst>
+                <a:tab pos="4727575" algn="l"/>
+              </a:tabLst>
+            </a:pPr>
             <a:r>
               <a:rPr lang="cs-CZ" sz="2400" spc="-65" dirty="0">
                 <a:effectLst/>
@@ -2249,7 +2138,59 @@
                 <a:latin typeface="+mj-lt"/>
                 <a:ea typeface="Arial" panose="020B0604020202020204" pitchFamily="34" charset="0"/>
               </a:rPr>
-              <a:t>jaké povinnosti má běžný uživatel zařízení (počítač, mobil) s internetovým připojením. Shrňte právní odpovědnost  uživatele  do základního velmi  jednoduchého a přehledného materiálu, který bude možno použít pro vzdělávání laiků v této oblasti. Cílem tohoto projektu je  jednak pro studenta  zvýšení znalosti toho,  co je legální a kdy už porušuje zákon v </a:t>
+              <a:t>jaké povinnosti má běžný uživatel zařízení (počítač, mobil) s internetovým připojením. </a:t>
+            </a:r>
+            <a:endParaRPr lang="en-US" sz="2400" spc="-65" dirty="0">
+              <a:effectLst/>
+              <a:latin typeface="+mj-lt"/>
+              <a:ea typeface="Arial" panose="020B0604020202020204" pitchFamily="34" charset="0"/>
+            </a:endParaRPr>
+          </a:p>
+          <a:p>
+            <a:pPr marL="102870" algn="just">
+              <a:spcBef>
+                <a:spcPts val="490"/>
+              </a:spcBef>
+              <a:spcAft>
+                <a:spcPts val="0"/>
+              </a:spcAft>
+              <a:tabLst>
+                <a:tab pos="4727575" algn="l"/>
+              </a:tabLst>
+            </a:pPr>
+            <a:r>
+              <a:rPr lang="cs-CZ" sz="2400" spc="-65" dirty="0">
+                <a:effectLst/>
+                <a:latin typeface="+mj-lt"/>
+                <a:ea typeface="Arial" panose="020B0604020202020204" pitchFamily="34" charset="0"/>
+              </a:rPr>
+              <a:t>Shrňte právní odpovědnost  uživatele  do základního velmi  jednoduchého a přehledného materiálu, který bude možno použít pro vzdělávání laiků v této oblasti. </a:t>
+            </a:r>
+            <a:endParaRPr lang="en-US" sz="2400" spc="-65" dirty="0">
+              <a:effectLst/>
+              <a:latin typeface="+mj-lt"/>
+              <a:ea typeface="Arial" panose="020B0604020202020204" pitchFamily="34" charset="0"/>
+            </a:endParaRPr>
+          </a:p>
+          <a:p>
+            <a:pPr marL="102870" algn="just">
+              <a:spcBef>
+                <a:spcPts val="490"/>
+              </a:spcBef>
+              <a:spcAft>
+                <a:spcPts val="0"/>
+              </a:spcAft>
+              <a:tabLst>
+                <a:tab pos="4727575" algn="l"/>
+              </a:tabLst>
+            </a:pPr>
+            <a:r>
+              <a:rPr lang="cs-CZ" sz="2400" spc="-65" dirty="0">
+                <a:effectLst/>
+                <a:latin typeface="+mj-lt"/>
+                <a:ea typeface="Arial" panose="020B0604020202020204" pitchFamily="34" charset="0"/>
+              </a:rPr>
+              <a:t>Cílem tohoto projektu je  jednak pro studenta  zvýšení znalosti toho,  co je legální a kdy už porušuje zákon v </a:t>
             </a:r>
             <a:r>
               <a:rPr lang="cs-CZ" sz="2400" spc="-65" dirty="0" err="1">
@@ -2357,7 +2298,7 @@
         </p:spPr>
         <p:txBody>
           <a:bodyPr>
-            <a:normAutofit lnSpcReduction="10000"/>
+            <a:normAutofit/>
           </a:bodyPr>
           <a:lstStyle/>
           <a:p>
@@ -2376,105 +2317,6 @@
             <a:r>
               <a:rPr lang="en-US" dirty="0"/>
               <a:t>0/2009 Sb.</a:t>
-            </a:r>
-          </a:p>
-          <a:p>
-            <a:r>
-              <a:rPr lang="cs-CZ" dirty="0">
-                <a:effectLst/>
-                <a:latin typeface="+mj-lt"/>
-              </a:rPr>
-              <a:t>§ 230</a:t>
-            </a:r>
-            <a:r>
-              <a:rPr lang="en-US" dirty="0">
-                <a:latin typeface="+mj-lt"/>
-              </a:rPr>
-              <a:t> </a:t>
-            </a:r>
-            <a:r>
-              <a:rPr lang="cs-CZ" dirty="0">
-                <a:effectLst/>
-                <a:latin typeface="+mj-lt"/>
-              </a:rPr>
-              <a:t>Neoprávněný přístup k počítačovému systému a nosiči informací</a:t>
-            </a:r>
-            <a:r>
-              <a:rPr lang="en-US" dirty="0">
-                <a:effectLst/>
-                <a:latin typeface="+mj-lt"/>
-              </a:rPr>
-              <a:t> – </a:t>
-            </a:r>
-            <a:endParaRPr lang="en-US" dirty="0">
-              <a:latin typeface="+mj-lt"/>
-            </a:endParaRPr>
-          </a:p>
-          <a:p>
-            <a:r>
-              <a:rPr lang="cs-CZ" dirty="0">
-                <a:latin typeface="+mj-lt"/>
-              </a:rPr>
-              <a:t>P</a:t>
-            </a:r>
-            <a:r>
-              <a:rPr lang="cs-CZ" b="0" dirty="0">
-                <a:effectLst/>
-                <a:latin typeface="+mj-lt"/>
-              </a:rPr>
-              <a:t>řekonání bezpečnostního opatření k neoprávněnému přístupu k počítačovému systému</a:t>
-            </a:r>
-          </a:p>
-          <a:p>
-            <a:r>
-              <a:rPr lang="cs-CZ" b="0" dirty="0">
-                <a:effectLst/>
-                <a:latin typeface="+mj-lt"/>
-              </a:rPr>
-              <a:t>Tzn. že i když mám heslo na papírku vedle počítače, nemohu ho použít, protože bych porušil zákon.</a:t>
-            </a:r>
-          </a:p>
-          <a:p>
-            <a:br>
-              <a:rPr lang="cs-CZ" b="0" dirty="0">
-                <a:effectLst/>
-                <a:latin typeface="+mj-lt"/>
-              </a:rPr>
-            </a:br>
-            <a:r>
-              <a:rPr lang="cs-CZ" b="0" dirty="0">
-                <a:effectLst/>
-                <a:latin typeface="+mj-lt"/>
-              </a:rPr>
-              <a:t>Podle odstavce 2 je zakázáno jakkoli modifikovat či smazat data z počítačového systému nebo je neoprávněně použ</a:t>
-            </a:r>
-            <a:r>
-              <a:rPr lang="cs-CZ" dirty="0">
-                <a:latin typeface="+mj-lt"/>
-              </a:rPr>
-              <a:t>ít</a:t>
-            </a:r>
-            <a:r>
-              <a:rPr lang="cs-CZ" b="0" dirty="0">
-                <a:effectLst/>
-                <a:latin typeface="+mj-lt"/>
-              </a:rPr>
-              <a:t>, padělat atd. </a:t>
-            </a:r>
-          </a:p>
-          <a:p>
-            <a:br>
-              <a:rPr lang="cs-CZ" b="0" dirty="0">
-                <a:effectLst/>
-                <a:latin typeface="+mj-lt"/>
-              </a:rPr>
-            </a:br>
-            <a:r>
-              <a:rPr lang="cs-CZ" b="0" dirty="0">
-                <a:effectLst/>
-                <a:latin typeface="+mj-lt"/>
-              </a:rPr>
-              <a:t>Podle odstavce tři nesmí uživatel způsobit jinému škodu nebo omezit funkčnost počítačového systému.</a:t>
             </a:r>
           </a:p>
           <a:p>
@@ -2523,200 +2365,6 @@
           <p:cNvPr id="2" name="Nadpis 1">
             <a:extLst>
               <a:ext uri="{FF2B5EF4-FFF2-40B4-BE49-F238E27FC236}">
-                <a16:creationId xmlns:a16="http://schemas.microsoft.com/office/drawing/2014/main" id="{6930C740-EE3C-4BC4-80A3-84FDB1B80BD6}"/>
-              </a:ext>
-            </a:extLst>
-          </p:cNvPr>
-          <p:cNvSpPr>
-            <a:spLocks noGrp="1"/>
-          </p:cNvSpPr>
-          <p:nvPr>
-            <p:ph type="title"/>
-          </p:nvPr>
-        </p:nvSpPr>
-        <p:spPr/>
-        <p:txBody>
-          <a:bodyPr/>
-          <a:lstStyle/>
-          <a:p>
-            <a:r>
-              <a:rPr lang="cs-CZ" dirty="0"/>
-              <a:t>Paragrafy trestního zákoníku</a:t>
-            </a:r>
-          </a:p>
-        </p:txBody>
-      </p:sp>
-      <p:sp>
-        <p:nvSpPr>
-          <p:cNvPr id="3" name="Zástupný obsah 2">
-            <a:extLst>
-              <a:ext uri="{FF2B5EF4-FFF2-40B4-BE49-F238E27FC236}">
-                <a16:creationId xmlns:a16="http://schemas.microsoft.com/office/drawing/2014/main" id="{9B25AA22-F3ED-4F44-AC77-58728690003D}"/>
-              </a:ext>
-            </a:extLst>
-          </p:cNvPr>
-          <p:cNvSpPr>
-            <a:spLocks noGrp="1"/>
-          </p:cNvSpPr>
-          <p:nvPr>
-            <p:ph idx="1"/>
-          </p:nvPr>
-        </p:nvSpPr>
-        <p:spPr>
-          <a:xfrm>
-            <a:off x="937846" y="3059766"/>
-            <a:ext cx="11254154" cy="3528000"/>
-          </a:xfrm>
-        </p:spPr>
-        <p:txBody>
-          <a:bodyPr>
-            <a:normAutofit/>
-          </a:bodyPr>
-          <a:lstStyle/>
-          <a:p>
-            <a:r>
-              <a:rPr lang="cs-CZ" dirty="0">
-                <a:effectLst/>
-                <a:latin typeface="+mj-lt"/>
-              </a:rPr>
-              <a:t>§ 231</a:t>
-            </a:r>
-            <a:r>
-              <a:rPr lang="en-US" dirty="0">
-                <a:latin typeface="+mj-lt"/>
-              </a:rPr>
-              <a:t> </a:t>
-            </a:r>
-            <a:r>
-              <a:rPr lang="cs-CZ" dirty="0">
-                <a:effectLst/>
-                <a:latin typeface="+mj-lt"/>
-              </a:rPr>
-              <a:t>Opatření a přechovávání přístupového zařízení a hesla k počítačovému systému a jiných takových dat</a:t>
-            </a:r>
-          </a:p>
-          <a:p>
-            <a:r>
-              <a:rPr lang="cs-CZ" b="0" dirty="0">
-                <a:effectLst/>
-                <a:latin typeface="+mj-lt"/>
-              </a:rPr>
-              <a:t>Zakazuje podle trestného činu porušení tajemství či neoprávněného přístupu k nosiči informací. S použitím nástroje, postupu, programu a dalších věcí k získání přístupu.</a:t>
-            </a:r>
-          </a:p>
-          <a:p>
-            <a:r>
-              <a:rPr lang="cs-CZ" dirty="0">
-                <a:latin typeface="+mj-lt"/>
-              </a:rPr>
-              <a:t>Daný trestný čin dále eskaluje jedná-li v rámci organizované skupiny nebo se jedná o značný prospěch pro někoho</a:t>
-            </a:r>
-          </a:p>
-          <a:p>
-            <a:r>
-              <a:rPr lang="cs-CZ" dirty="0">
-                <a:effectLst/>
-                <a:latin typeface="+mj-lt"/>
-              </a:rPr>
-              <a:t>§ 232</a:t>
-            </a:r>
-            <a:r>
-              <a:rPr lang="cs-CZ" dirty="0">
-                <a:latin typeface="+mj-lt"/>
-              </a:rPr>
-              <a:t> </a:t>
-            </a:r>
-            <a:r>
-              <a:rPr lang="cs-CZ" dirty="0">
-                <a:effectLst/>
-                <a:latin typeface="+mj-lt"/>
-              </a:rPr>
-              <a:t>Poškození záznamu v počítačovém systému a na nosiči informací a zásah do vybavení počítače z nedbalosti - </a:t>
-            </a:r>
-            <a:r>
-              <a:rPr lang="cs-CZ" b="0" dirty="0">
-                <a:effectLst/>
-                <a:latin typeface="+mj-lt"/>
-              </a:rPr>
-              <a:t>Je poškození, zničení nebo učiní neupotřebitelnými a tím způsobí na cizím majetku značnou </a:t>
-            </a:r>
-          </a:p>
-          <a:p>
-            <a:r>
-              <a:rPr lang="cs-CZ" dirty="0">
-                <a:latin typeface="+mj-lt"/>
-              </a:rPr>
-              <a:t>Podle těchto paragrafů se určují trestné činy s výpočetní technikou ale vždy se jedná tento trestný čin spolu s nějakým, jako např. urážkou na cti, vydíráním atd.</a:t>
-            </a:r>
-            <a:br>
-              <a:rPr lang="cs-CZ" b="0" dirty="0">
-                <a:solidFill>
-                  <a:srgbClr val="D4D4D4"/>
-                </a:solidFill>
-                <a:effectLst/>
-                <a:latin typeface="Consolas" panose="020B0609020204030204" pitchFamily="49" charset="0"/>
-              </a:rPr>
-            </a:br>
-            <a:endParaRPr lang="cs-CZ" b="0" dirty="0">
-              <a:solidFill>
-                <a:srgbClr val="D4D4D4"/>
-              </a:solidFill>
-              <a:effectLst/>
-              <a:latin typeface="Consolas" panose="020B0609020204030204" pitchFamily="49" charset="0"/>
-            </a:endParaRPr>
-          </a:p>
-          <a:p>
-            <a:endParaRPr lang="cs-CZ" dirty="0">
-              <a:effectLst/>
-              <a:latin typeface="+mj-lt"/>
-            </a:endParaRPr>
-          </a:p>
-          <a:p>
-            <a:endParaRPr lang="cs-CZ" b="0" dirty="0">
-              <a:effectLst/>
-              <a:latin typeface="+mj-lt"/>
-            </a:endParaRPr>
-          </a:p>
-          <a:p>
-            <a:endParaRPr lang="cs-CZ" dirty="0"/>
-          </a:p>
-        </p:txBody>
-      </p:sp>
-    </p:spTree>
-    <p:extLst>
-      <p:ext uri="{BB962C8B-B14F-4D97-AF65-F5344CB8AC3E}">
-        <p14:creationId xmlns:p14="http://schemas.microsoft.com/office/powerpoint/2010/main" val="3863552915"/>
-      </p:ext>
-    </p:extLst>
-  </p:cSld>
-  <p:clrMapOvr>
-    <a:masterClrMapping/>
-  </p:clrMapOvr>
-</p:sld>
-</file>
-
-<file path=ppt/slides/slide6.xml><?xml version="1.0" encoding="utf-8"?>
-<p:sld xmlns:a="http://schemas.openxmlformats.org/drawingml/2006/main" xmlns:r="http://schemas.openxmlformats.org/officeDocument/2006/relationships" xmlns:p="http://schemas.openxmlformats.org/presentationml/2006/main">
-  <p:cSld>
-    <p:spTree>
-      <p:nvGrpSpPr>
-        <p:cNvPr id="1" name=""/>
-        <p:cNvGrpSpPr/>
-        <p:nvPr/>
-      </p:nvGrpSpPr>
-      <p:grpSpPr>
-        <a:xfrm>
-          <a:off x="0" y="0"/>
-          <a:ext cx="0" cy="0"/>
-          <a:chOff x="0" y="0"/>
-          <a:chExt cx="0" cy="0"/>
-        </a:xfrm>
-      </p:grpSpPr>
-      <p:sp>
-        <p:nvSpPr>
-          <p:cNvPr id="2" name="Nadpis 1">
-            <a:extLst>
-              <a:ext uri="{FF2B5EF4-FFF2-40B4-BE49-F238E27FC236}">
                 <a16:creationId xmlns:a16="http://schemas.microsoft.com/office/drawing/2014/main" id="{E93DC8BC-99C8-4ED3-AFC7-C8B6D808FD0E}"/>
               </a:ext>
             </a:extLst>
@@ -2840,7 +2488,7 @@
 </p:sld>
 </file>
 
-<file path=ppt/slides/slide7.xml><?xml version="1.0" encoding="utf-8"?>
+<file path=ppt/slides/slide6.xml><?xml version="1.0" encoding="utf-8"?>
 <p:sld xmlns:a="http://schemas.openxmlformats.org/drawingml/2006/main" xmlns:r="http://schemas.openxmlformats.org/officeDocument/2006/relationships" xmlns:p="http://schemas.openxmlformats.org/presentationml/2006/main">
   <p:cSld>
     <p:spTree>
@@ -2955,19 +2603,7 @@
               <a:rPr lang="cs-CZ" dirty="0">
                 <a:latin typeface="+mn-lt"/>
               </a:rPr>
-              <a:t>Běžný uživatel, který se nenachází v pozici pracovníka významné nebo kritické </a:t>
-            </a:r>
-            <a:r>
-              <a:rPr lang="cs-CZ" dirty="0" err="1">
-                <a:latin typeface="+mn-lt"/>
-              </a:rPr>
-              <a:t>síťe</a:t>
-            </a:r>
-            <a:r>
-              <a:rPr lang="cs-CZ" dirty="0">
-                <a:latin typeface="+mn-lt"/>
-              </a:rPr>
-              <a:t> elektronických komunikací nebo informačního systému nemusí dodržovat varování od úřadu varování a nebude za to trestán.</a:t>
+              <a:t>Běžný uživatel, který se nenachází v pozici pracovníka významné nebo kritické sítě elektronických komunikací nebo informačního systému nemusí dodržovat varování od úřadu varování a nebude za to trestán.</a:t>
             </a:r>
           </a:p>
           <a:p>
@@ -2997,7 +2633,7 @@
 </p:sld>
 </file>
 
-<file path=ppt/slides/slide8.xml><?xml version="1.0" encoding="utf-8"?>
+<file path=ppt/slides/slide7.xml><?xml version="1.0" encoding="utf-8"?>
 <p:sld xmlns:a="http://schemas.openxmlformats.org/drawingml/2006/main" xmlns:r="http://schemas.openxmlformats.org/officeDocument/2006/relationships" xmlns:p="http://schemas.openxmlformats.org/presentationml/2006/main">
   <p:cSld>
     <p:spTree>
@@ -3088,7 +2724,7 @@
 </p:sld>
 </file>
 
-<file path=ppt/slides/slide9.xml><?xml version="1.0" encoding="utf-8"?>
+<file path=ppt/slides/slide8.xml><?xml version="1.0" encoding="utf-8"?>
 <p:sld xmlns:a="http://schemas.openxmlformats.org/drawingml/2006/main" xmlns:r="http://schemas.openxmlformats.org/officeDocument/2006/relationships" xmlns:p="http://schemas.openxmlformats.org/presentationml/2006/main">
   <p:cSld>
     <p:spTree>
@@ -3144,6 +2780,372 @@
     <p:extLst>
       <p:ext uri="{BB962C8B-B14F-4D97-AF65-F5344CB8AC3E}">
         <p14:creationId xmlns:p14="http://schemas.microsoft.com/office/powerpoint/2010/main" val="3347645221"/>
+      </p:ext>
+    </p:extLst>
+  </p:cSld>
+  <p:clrMapOvr>
+    <a:masterClrMapping/>
+  </p:clrMapOvr>
+</p:sld>
+</file>
+
+<file path=ppt/slides/slide9.xml><?xml version="1.0" encoding="utf-8"?>
+<p:sld xmlns:a="http://schemas.openxmlformats.org/drawingml/2006/main" xmlns:r="http://schemas.openxmlformats.org/officeDocument/2006/relationships" xmlns:p="http://schemas.openxmlformats.org/presentationml/2006/main">
+  <p:cSld>
+    <p:spTree>
+      <p:nvGrpSpPr>
+        <p:cNvPr id="1" name=""/>
+        <p:cNvGrpSpPr/>
+        <p:nvPr/>
+      </p:nvGrpSpPr>
+      <p:grpSpPr>
+        <a:xfrm>
+          <a:off x="0" y="0"/>
+          <a:ext cx="0" cy="0"/>
+          <a:chOff x="0" y="0"/>
+          <a:chExt cx="0" cy="0"/>
+        </a:xfrm>
+      </p:grpSpPr>
+      <p:sp>
+        <p:nvSpPr>
+          <p:cNvPr id="2" name="Nadpis 1">
+            <a:extLst>
+              <a:ext uri="{FF2B5EF4-FFF2-40B4-BE49-F238E27FC236}">
+                <a16:creationId xmlns:a16="http://schemas.microsoft.com/office/drawing/2014/main" id="{4AD65151-25F6-4CAA-8F2F-583CC6D94A46}"/>
+              </a:ext>
+            </a:extLst>
+          </p:cNvPr>
+          <p:cNvSpPr>
+            <a:spLocks noGrp="1"/>
+          </p:cNvSpPr>
+          <p:nvPr>
+            <p:ph type="title"/>
+          </p:nvPr>
+        </p:nvSpPr>
+        <p:spPr/>
+        <p:txBody>
+          <a:bodyPr/>
+          <a:lstStyle/>
+          <a:p>
+            <a:r>
+              <a:rPr lang="cs-CZ">
+                <a:cs typeface="Calibri Light"/>
+              </a:rPr>
+              <a:t>Zdroje</a:t>
+            </a:r>
+          </a:p>
+        </p:txBody>
+      </p:sp>
+      <p:sp>
+        <p:nvSpPr>
+          <p:cNvPr id="3" name="Zástupný obsah 2">
+            <a:extLst>
+              <a:ext uri="{FF2B5EF4-FFF2-40B4-BE49-F238E27FC236}">
+                <a16:creationId xmlns:a16="http://schemas.microsoft.com/office/drawing/2014/main" id="{53BD2864-2797-45C9-BA46-310944DCC4E3}"/>
+              </a:ext>
+            </a:extLst>
+          </p:cNvPr>
+          <p:cNvSpPr>
+            <a:spLocks noGrp="1"/>
+          </p:cNvSpPr>
+          <p:nvPr>
+            <p:ph idx="1"/>
+          </p:nvPr>
+        </p:nvSpPr>
+        <p:spPr/>
+        <p:txBody>
+          <a:bodyPr vert="horz" lIns="91440" tIns="45720" rIns="91440" bIns="45720" rtlCol="0" anchor="t">
+            <a:normAutofit/>
+          </a:bodyPr>
+          <a:lstStyle/>
+          <a:p>
+            <a:r>
+              <a:rPr lang="cs-CZ" dirty="0">
+                <a:ea typeface="+mn-lt"/>
+                <a:cs typeface="+mn-lt"/>
+              </a:rPr>
+              <a:t>https://www.policie.cz/</a:t>
+            </a:r>
+            <a:r>
+              <a:rPr lang="cs-CZ" dirty="0" err="1">
+                <a:ea typeface="+mn-lt"/>
+                <a:cs typeface="+mn-lt"/>
+              </a:rPr>
+              <a:t>clanek</a:t>
+            </a:r>
+            <a:r>
+              <a:rPr lang="cs-CZ" dirty="0">
+                <a:ea typeface="+mn-lt"/>
+                <a:cs typeface="+mn-lt"/>
+              </a:rPr>
+              <a:t>/jednotlive-druhy-kyberkriminality.aspx#:~:text=Neopr%C3%A1vn%C4%9Bn%C3%BD%20p%C5%99%C3%ADstup%20k%20po%C4%8D%C3%ADta%C4%8Dov%C3%A9mu%20syst%C3%A9mu,neposledn%C3%AD%20%C5%99ad%C4%9B%20i%20zneu%C5%BE%C3%ADv%C3%A1n%C3%AD%20za%C5%99%C3%ADzen%C3%AD.</a:t>
+            </a:r>
+            <a:endParaRPr lang="en-US" dirty="0">
+              <a:ea typeface="+mn-lt"/>
+              <a:cs typeface="+mn-lt"/>
+            </a:endParaRPr>
+          </a:p>
+          <a:p>
+            <a:r>
+              <a:rPr lang="en-US" dirty="0" err="1">
+                <a:effectLst/>
+                <a:latin typeface="+mn-lt"/>
+              </a:rPr>
+              <a:t>Seznam</a:t>
+            </a:r>
+            <a:r>
+              <a:rPr lang="en-US" dirty="0">
+                <a:effectLst/>
+                <a:latin typeface="+mn-lt"/>
+              </a:rPr>
+              <a:t> </a:t>
+            </a:r>
+            <a:r>
+              <a:rPr lang="en-US" dirty="0" err="1">
+                <a:effectLst/>
+                <a:latin typeface="+mn-lt"/>
+              </a:rPr>
+              <a:t>odborné</a:t>
+            </a:r>
+            <a:r>
+              <a:rPr lang="en-US" dirty="0">
+                <a:effectLst/>
+                <a:latin typeface="+mn-lt"/>
+              </a:rPr>
+              <a:t> </a:t>
+            </a:r>
+            <a:r>
+              <a:rPr lang="en-US" dirty="0" err="1">
+                <a:effectLst/>
+                <a:latin typeface="+mn-lt"/>
+              </a:rPr>
+              <a:t>literatury</a:t>
+            </a:r>
+            <a:r>
+              <a:rPr lang="en-US" dirty="0">
+                <a:effectLst/>
+                <a:latin typeface="+mn-lt"/>
+              </a:rPr>
+              <a:t>:</a:t>
+            </a:r>
+            <a:br>
+              <a:rPr lang="en-US" dirty="0">
+                <a:effectLst/>
+                <a:latin typeface="+mn-lt"/>
+              </a:rPr>
+            </a:br>
+            <a:r>
+              <a:rPr lang="en-US" dirty="0">
+                <a:effectLst/>
+                <a:latin typeface="+mn-lt"/>
+              </a:rPr>
+              <a:t> &lt;</a:t>
+            </a:r>
+            <a:r>
+              <a:rPr lang="en-US" u="sng" dirty="0">
+                <a:effectLst/>
+                <a:latin typeface="+mn-lt"/>
+              </a:rPr>
+              <a:t>https://www.zakonyprolidi.cz/cs/2009-40</a:t>
+            </a:r>
+            <a:r>
+              <a:rPr lang="en-US" dirty="0">
+                <a:effectLst/>
+                <a:latin typeface="+mn-lt"/>
+              </a:rPr>
+              <a:t>&gt;  </a:t>
+            </a:r>
+            <a:r>
+              <a:rPr lang="en-US" dirty="0" err="1">
+                <a:effectLst/>
+                <a:latin typeface="+mn-lt"/>
+              </a:rPr>
+              <a:t>aktuální</a:t>
+            </a:r>
+            <a:r>
+              <a:rPr lang="en-US" dirty="0">
+                <a:effectLst/>
+                <a:latin typeface="+mn-lt"/>
+              </a:rPr>
+              <a:t> </a:t>
+            </a:r>
+            <a:r>
+              <a:rPr lang="en-US" dirty="0" err="1">
+                <a:effectLst/>
+                <a:latin typeface="+mn-lt"/>
+              </a:rPr>
+              <a:t>znění</a:t>
+            </a:r>
+            <a:endParaRPr lang="en-US" dirty="0">
+              <a:effectLst/>
+              <a:latin typeface="+mn-lt"/>
+            </a:endParaRPr>
+          </a:p>
+          <a:p>
+            <a:r>
+              <a:rPr lang="en-US" dirty="0">
+                <a:effectLst/>
+                <a:latin typeface="+mn-lt"/>
+              </a:rPr>
+              <a:t> Jan </a:t>
+            </a:r>
+            <a:r>
+              <a:rPr lang="en-US" dirty="0" err="1">
+                <a:effectLst/>
+                <a:latin typeface="+mn-lt"/>
+              </a:rPr>
+              <a:t>Kolouch</a:t>
+            </a:r>
+            <a:r>
+              <a:rPr lang="en-US" dirty="0">
+                <a:effectLst/>
+                <a:latin typeface="+mn-lt"/>
+              </a:rPr>
+              <a:t> a </a:t>
+            </a:r>
+            <a:r>
+              <a:rPr lang="en-US" dirty="0" err="1">
+                <a:effectLst/>
+                <a:latin typeface="+mn-lt"/>
+              </a:rPr>
+              <a:t>kolektiv</a:t>
+            </a:r>
+            <a:r>
+              <a:rPr lang="en-US" dirty="0">
+                <a:effectLst/>
+                <a:latin typeface="+mn-lt"/>
+              </a:rPr>
+              <a:t>, "CYBERSECURITY", &lt;</a:t>
+            </a:r>
+            <a:r>
+              <a:rPr lang="en-US" u="sng" dirty="0">
+                <a:effectLst/>
+                <a:latin typeface="+mn-lt"/>
+              </a:rPr>
+              <a:t>https://knihy.nic.cz/files/edice/cybersecurity.pdf</a:t>
+            </a:r>
+            <a:r>
+              <a:rPr lang="en-US" dirty="0">
+                <a:effectLst/>
+                <a:latin typeface="+mn-lt"/>
+              </a:rPr>
+              <a:t>&gt;</a:t>
+            </a:r>
+          </a:p>
+          <a:p>
+            <a:r>
+              <a:rPr lang="en-US" dirty="0">
+                <a:effectLst/>
+                <a:latin typeface="+mn-lt"/>
+              </a:rPr>
+              <a:t> &lt;</a:t>
+            </a:r>
+            <a:r>
+              <a:rPr lang="en-US" u="sng" dirty="0">
+                <a:effectLst/>
+                <a:latin typeface="+mn-lt"/>
+              </a:rPr>
+              <a:t>https://www.nukib.cz/cs/</a:t>
+            </a:r>
+            <a:r>
+              <a:rPr lang="en-US" dirty="0">
+                <a:effectLst/>
+                <a:latin typeface="+mn-lt"/>
+              </a:rPr>
+              <a:t>&gt;, </a:t>
+            </a:r>
+            <a:r>
+              <a:rPr lang="en-US" dirty="0" err="1">
+                <a:effectLst/>
+                <a:latin typeface="+mn-lt"/>
+              </a:rPr>
+              <a:t>vzdělávací</a:t>
+            </a:r>
+            <a:r>
+              <a:rPr lang="en-US" dirty="0">
+                <a:effectLst/>
+                <a:latin typeface="+mn-lt"/>
+              </a:rPr>
+              <a:t> </a:t>
+            </a:r>
+            <a:r>
+              <a:rPr lang="en-US" dirty="0" err="1">
+                <a:effectLst/>
+                <a:latin typeface="+mn-lt"/>
+              </a:rPr>
+              <a:t>materiály</a:t>
+            </a:r>
+            <a:endParaRPr lang="en-US" dirty="0">
+              <a:effectLst/>
+              <a:latin typeface="+mn-lt"/>
+            </a:endParaRPr>
+          </a:p>
+          <a:p>
+            <a:r>
+              <a:rPr lang="en-US" dirty="0">
+                <a:effectLst/>
+                <a:latin typeface="+mn-lt"/>
+              </a:rPr>
+              <a:t> &lt;</a:t>
+            </a:r>
+            <a:r>
+              <a:rPr lang="en-US" u="sng" dirty="0">
+                <a:effectLst/>
+                <a:latin typeface="+mn-lt"/>
+              </a:rPr>
+              <a:t>https://www.zakonyprolidi.cz/cs/2014-181</a:t>
+            </a:r>
+            <a:r>
+              <a:rPr lang="en-US" dirty="0">
+                <a:effectLst/>
+                <a:latin typeface="+mn-lt"/>
+              </a:rPr>
+              <a:t>&gt; </a:t>
+            </a:r>
+            <a:r>
+              <a:rPr lang="en-US" dirty="0" err="1">
+                <a:effectLst/>
+                <a:latin typeface="+mn-lt"/>
+              </a:rPr>
+              <a:t>aktuální</a:t>
+            </a:r>
+            <a:r>
+              <a:rPr lang="en-US" dirty="0">
+                <a:effectLst/>
+                <a:latin typeface="+mn-lt"/>
+              </a:rPr>
+              <a:t> </a:t>
+            </a:r>
+            <a:r>
+              <a:rPr lang="en-US" dirty="0" err="1">
+                <a:effectLst/>
+                <a:latin typeface="+mn-lt"/>
+              </a:rPr>
+              <a:t>znění</a:t>
+            </a:r>
+            <a:endParaRPr lang="en-US" dirty="0">
+              <a:effectLst/>
+              <a:latin typeface="+mn-lt"/>
+            </a:endParaRPr>
+          </a:p>
+          <a:p>
+            <a:endParaRPr lang="en-US" dirty="0">
+              <a:ea typeface="+mn-lt"/>
+              <a:cs typeface="+mn-lt"/>
+            </a:endParaRPr>
+          </a:p>
+          <a:p>
+            <a:endParaRPr lang="cs-CZ" dirty="0">
+              <a:ea typeface="+mn-lt"/>
+              <a:cs typeface="+mn-lt"/>
+            </a:endParaRPr>
+          </a:p>
+        </p:txBody>
+      </p:sp>
+    </p:spTree>
+    <p:extLst>
+      <p:ext uri="{BB962C8B-B14F-4D97-AF65-F5344CB8AC3E}">
+        <p14:creationId xmlns:p14="http://schemas.microsoft.com/office/powerpoint/2010/main" val="1594678827"/>
       </p:ext>
     </p:extLst>
   </p:cSld>

</xml_diff>

<commit_message>
finishing for today presentation
</commit_message>
<xml_diff>
--- a/Kochanek_projekt_II_it_use_liability.pptx
+++ b/Kochanek_projekt_II_it_use_liability.pptx
@@ -5,7 +5,7 @@
     <p:sldMasterId id="2147483660" r:id="rId1"/>
   </p:sldMasterIdLst>
   <p:notesMasterIdLst>
-    <p:notesMasterId r:id="rId11"/>
+    <p:notesMasterId r:id="rId12"/>
   </p:notesMasterIdLst>
   <p:sldIdLst>
     <p:sldId id="256" r:id="rId2"/>
@@ -15,8 +15,9 @@
     <p:sldId id="271" r:id="rId6"/>
     <p:sldId id="272" r:id="rId7"/>
     <p:sldId id="273" r:id="rId8"/>
-    <p:sldId id="268" r:id="rId9"/>
-    <p:sldId id="261" r:id="rId10"/>
+    <p:sldId id="274" r:id="rId9"/>
+    <p:sldId id="268" r:id="rId10"/>
+    <p:sldId id="261" r:id="rId11"/>
   </p:sldIdLst>
   <p:sldSz cx="12192000" cy="6858000"/>
   <p:notesSz cx="6858000" cy="9144000"/>
@@ -1831,6 +1832,387 @@
 </p:sld>
 </file>
 
+<file path=ppt/slides/slide10.xml><?xml version="1.0" encoding="utf-8"?>
+<p:sld xmlns:a="http://schemas.openxmlformats.org/drawingml/2006/main" xmlns:r="http://schemas.openxmlformats.org/officeDocument/2006/relationships" xmlns:p="http://schemas.openxmlformats.org/presentationml/2006/main">
+  <p:cSld>
+    <p:spTree>
+      <p:nvGrpSpPr>
+        <p:cNvPr id="1" name=""/>
+        <p:cNvGrpSpPr/>
+        <p:nvPr/>
+      </p:nvGrpSpPr>
+      <p:grpSpPr>
+        <a:xfrm>
+          <a:off x="0" y="0"/>
+          <a:ext cx="0" cy="0"/>
+          <a:chOff x="0" y="0"/>
+          <a:chExt cx="0" cy="0"/>
+        </a:xfrm>
+      </p:grpSpPr>
+      <p:sp>
+        <p:nvSpPr>
+          <p:cNvPr id="2" name="Nadpis 1">
+            <a:extLst>
+              <a:ext uri="{FF2B5EF4-FFF2-40B4-BE49-F238E27FC236}">
+                <a16:creationId xmlns:a16="http://schemas.microsoft.com/office/drawing/2014/main" id="{4AD65151-25F6-4CAA-8F2F-583CC6D94A46}"/>
+              </a:ext>
+            </a:extLst>
+          </p:cNvPr>
+          <p:cNvSpPr>
+            <a:spLocks noGrp="1"/>
+          </p:cNvSpPr>
+          <p:nvPr>
+            <p:ph type="title"/>
+          </p:nvPr>
+        </p:nvSpPr>
+        <p:spPr/>
+        <p:txBody>
+          <a:bodyPr/>
+          <a:lstStyle/>
+          <a:p>
+            <a:r>
+              <a:rPr lang="cs-CZ">
+                <a:cs typeface="Calibri Light"/>
+              </a:rPr>
+              <a:t>Zdroje</a:t>
+            </a:r>
+          </a:p>
+        </p:txBody>
+      </p:sp>
+      <p:sp>
+        <p:nvSpPr>
+          <p:cNvPr id="3" name="Zástupný obsah 2">
+            <a:extLst>
+              <a:ext uri="{FF2B5EF4-FFF2-40B4-BE49-F238E27FC236}">
+                <a16:creationId xmlns:a16="http://schemas.microsoft.com/office/drawing/2014/main" id="{53BD2864-2797-45C9-BA46-310944DCC4E3}"/>
+              </a:ext>
+            </a:extLst>
+          </p:cNvPr>
+          <p:cNvSpPr>
+            <a:spLocks noGrp="1"/>
+          </p:cNvSpPr>
+          <p:nvPr>
+            <p:ph idx="1"/>
+          </p:nvPr>
+        </p:nvSpPr>
+        <p:spPr/>
+        <p:txBody>
+          <a:bodyPr vert="horz" lIns="91440" tIns="45720" rIns="91440" bIns="45720" rtlCol="0" anchor="t">
+            <a:normAutofit/>
+          </a:bodyPr>
+          <a:lstStyle/>
+          <a:p>
+            <a:r>
+              <a:rPr lang="cs-CZ" sz="1200" dirty="0">
+                <a:ea typeface="+mn-lt"/>
+                <a:cs typeface="+mn-lt"/>
+              </a:rPr>
+              <a:t>https://www.policie.cz/</a:t>
+            </a:r>
+            <a:r>
+              <a:rPr lang="cs-CZ" sz="1200" dirty="0" err="1">
+                <a:ea typeface="+mn-lt"/>
+                <a:cs typeface="+mn-lt"/>
+              </a:rPr>
+              <a:t>clanek</a:t>
+            </a:r>
+            <a:r>
+              <a:rPr lang="cs-CZ" sz="1200" dirty="0">
+                <a:ea typeface="+mn-lt"/>
+                <a:cs typeface="+mn-lt"/>
+              </a:rPr>
+              <a:t>/jednotlive-druhy-kyberkriminality.aspx#:~:text=Neopr%C3%A1vn%C4%9Bn%C3%BD%20p%C5%99%C3%ADstup%20k%20po%C4%8D%C3%ADta%C4%8Dov%C3%A9mu%20syst%C3%A9mu,neposledn%C3%AD%20%C5%99ad%C4%9B%20i%20zneu%C5%BE%C3%ADv%C3%A1n%C3%AD%20za%C5%99%C3%ADzen%C3%AD.</a:t>
+            </a:r>
+          </a:p>
+          <a:p>
+            <a:r>
+              <a:rPr lang="en-US" sz="1200" dirty="0">
+                <a:ea typeface="+mn-lt"/>
+                <a:cs typeface="+mn-lt"/>
+              </a:rPr>
+              <a:t>https://www.centrumlidskaprava.cz/blog/moznost-pripojit-se-k-internetu-jako-lidske-pravo</a:t>
+            </a:r>
+            <a:endParaRPr lang="cs-CZ" sz="1200" dirty="0">
+              <a:ea typeface="+mn-lt"/>
+              <a:cs typeface="+mn-lt"/>
+            </a:endParaRPr>
+          </a:p>
+          <a:p>
+            <a:endParaRPr lang="en-US" sz="1200" dirty="0">
+              <a:ea typeface="+mn-lt"/>
+              <a:cs typeface="+mn-lt"/>
+            </a:endParaRPr>
+          </a:p>
+          <a:p>
+            <a:r>
+              <a:rPr lang="en-US" sz="1200" dirty="0" err="1">
+                <a:effectLst/>
+                <a:latin typeface="+mn-lt"/>
+              </a:rPr>
+              <a:t>Seznam</a:t>
+            </a:r>
+            <a:r>
+              <a:rPr lang="en-US" sz="1200" dirty="0">
+                <a:effectLst/>
+                <a:latin typeface="+mn-lt"/>
+              </a:rPr>
+              <a:t> </a:t>
+            </a:r>
+            <a:r>
+              <a:rPr lang="en-US" sz="1200" dirty="0" err="1">
+                <a:effectLst/>
+                <a:latin typeface="+mn-lt"/>
+              </a:rPr>
+              <a:t>odborné</a:t>
+            </a:r>
+            <a:r>
+              <a:rPr lang="en-US" sz="1200" dirty="0">
+                <a:effectLst/>
+                <a:latin typeface="+mn-lt"/>
+              </a:rPr>
+              <a:t> </a:t>
+            </a:r>
+            <a:r>
+              <a:rPr lang="en-US" sz="1200" dirty="0" err="1">
+                <a:effectLst/>
+                <a:latin typeface="+mn-lt"/>
+              </a:rPr>
+              <a:t>literatury</a:t>
+            </a:r>
+            <a:r>
+              <a:rPr lang="en-US" sz="1200" dirty="0">
+                <a:effectLst/>
+                <a:latin typeface="+mn-lt"/>
+              </a:rPr>
+              <a:t>:</a:t>
+            </a:r>
+            <a:br>
+              <a:rPr lang="en-US" sz="1200" dirty="0">
+                <a:effectLst/>
+                <a:latin typeface="+mn-lt"/>
+              </a:rPr>
+            </a:br>
+            <a:r>
+              <a:rPr lang="en-US" sz="1200" dirty="0">
+                <a:effectLst/>
+                <a:latin typeface="+mn-lt"/>
+              </a:rPr>
+              <a:t> &lt;</a:t>
+            </a:r>
+            <a:r>
+              <a:rPr lang="en-US" sz="1200" u="sng" dirty="0">
+                <a:effectLst/>
+                <a:latin typeface="+mn-lt"/>
+              </a:rPr>
+              <a:t>https://www.zakonyprolidi.cz/cs/2009-40</a:t>
+            </a:r>
+            <a:r>
+              <a:rPr lang="en-US" sz="1200" dirty="0">
+                <a:effectLst/>
+                <a:latin typeface="+mn-lt"/>
+              </a:rPr>
+              <a:t>&gt;  </a:t>
+            </a:r>
+            <a:r>
+              <a:rPr lang="en-US" sz="1200" dirty="0" err="1">
+                <a:effectLst/>
+                <a:latin typeface="+mn-lt"/>
+              </a:rPr>
+              <a:t>aktuální</a:t>
+            </a:r>
+            <a:r>
+              <a:rPr lang="en-US" sz="1200" dirty="0">
+                <a:effectLst/>
+                <a:latin typeface="+mn-lt"/>
+              </a:rPr>
+              <a:t> </a:t>
+            </a:r>
+            <a:r>
+              <a:rPr lang="en-US" sz="1200" dirty="0" err="1">
+                <a:effectLst/>
+                <a:latin typeface="+mn-lt"/>
+              </a:rPr>
+              <a:t>znění</a:t>
+            </a:r>
+            <a:endParaRPr lang="en-US" sz="1200" dirty="0">
+              <a:effectLst/>
+              <a:latin typeface="+mn-lt"/>
+            </a:endParaRPr>
+          </a:p>
+          <a:p>
+            <a:r>
+              <a:rPr lang="en-US" sz="1200" dirty="0">
+                <a:effectLst/>
+                <a:latin typeface="+mn-lt"/>
+              </a:rPr>
+              <a:t> Jan </a:t>
+            </a:r>
+            <a:r>
+              <a:rPr lang="en-US" sz="1200" dirty="0" err="1">
+                <a:effectLst/>
+                <a:latin typeface="+mn-lt"/>
+              </a:rPr>
+              <a:t>Kolouch</a:t>
+            </a:r>
+            <a:r>
+              <a:rPr lang="en-US" sz="1200" dirty="0">
+                <a:effectLst/>
+                <a:latin typeface="+mn-lt"/>
+              </a:rPr>
+              <a:t> a </a:t>
+            </a:r>
+            <a:r>
+              <a:rPr lang="en-US" sz="1200" dirty="0" err="1">
+                <a:effectLst/>
+                <a:latin typeface="+mn-lt"/>
+              </a:rPr>
+              <a:t>kolektiv</a:t>
+            </a:r>
+            <a:r>
+              <a:rPr lang="en-US" sz="1200" dirty="0">
+                <a:effectLst/>
+                <a:latin typeface="+mn-lt"/>
+              </a:rPr>
+              <a:t>, "CYBERSECURITY", &lt;</a:t>
+            </a:r>
+            <a:r>
+              <a:rPr lang="en-US" sz="1200" u="sng" dirty="0">
+                <a:effectLst/>
+                <a:latin typeface="+mn-lt"/>
+              </a:rPr>
+              <a:t>https://knihy.nic.cz/files/edice/cybersecurity.pdf</a:t>
+            </a:r>
+            <a:r>
+              <a:rPr lang="en-US" sz="1200" dirty="0">
+                <a:effectLst/>
+                <a:latin typeface="+mn-lt"/>
+              </a:rPr>
+              <a:t>&gt;</a:t>
+            </a:r>
+          </a:p>
+          <a:p>
+            <a:r>
+              <a:rPr lang="en-US" sz="1200" dirty="0">
+                <a:effectLst/>
+                <a:latin typeface="+mn-lt"/>
+              </a:rPr>
+              <a:t> &lt;</a:t>
+            </a:r>
+            <a:r>
+              <a:rPr lang="en-US" sz="1200" u="sng" dirty="0">
+                <a:effectLst/>
+                <a:latin typeface="+mn-lt"/>
+              </a:rPr>
+              <a:t>https://www.nukib.cz/cs/</a:t>
+            </a:r>
+            <a:r>
+              <a:rPr lang="en-US" sz="1200" dirty="0">
+                <a:effectLst/>
+                <a:latin typeface="+mn-lt"/>
+              </a:rPr>
+              <a:t>&gt;, </a:t>
+            </a:r>
+            <a:r>
+              <a:rPr lang="en-US" sz="1200" dirty="0" err="1">
+                <a:effectLst/>
+                <a:latin typeface="+mn-lt"/>
+              </a:rPr>
+              <a:t>vzdělávací</a:t>
+            </a:r>
+            <a:r>
+              <a:rPr lang="en-US" sz="1200" dirty="0">
+                <a:effectLst/>
+                <a:latin typeface="+mn-lt"/>
+              </a:rPr>
+              <a:t> </a:t>
+            </a:r>
+            <a:r>
+              <a:rPr lang="en-US" sz="1200" dirty="0" err="1">
+                <a:effectLst/>
+                <a:latin typeface="+mn-lt"/>
+              </a:rPr>
+              <a:t>materiály</a:t>
+            </a:r>
+            <a:endParaRPr lang="en-US" sz="1200" dirty="0">
+              <a:effectLst/>
+              <a:latin typeface="+mn-lt"/>
+            </a:endParaRPr>
+          </a:p>
+          <a:p>
+            <a:r>
+              <a:rPr lang="en-US" sz="1200" dirty="0">
+                <a:effectLst/>
+                <a:latin typeface="+mn-lt"/>
+              </a:rPr>
+              <a:t> &lt;</a:t>
+            </a:r>
+            <a:r>
+              <a:rPr lang="en-US" sz="1200" u="sng" dirty="0">
+                <a:effectLst/>
+                <a:latin typeface="+mn-lt"/>
+              </a:rPr>
+              <a:t>https://www.zakonyprolidi.cz/cs/2014-181</a:t>
+            </a:r>
+            <a:r>
+              <a:rPr lang="en-US" sz="1200" dirty="0">
+                <a:effectLst/>
+                <a:latin typeface="+mn-lt"/>
+              </a:rPr>
+              <a:t>&gt; </a:t>
+            </a:r>
+            <a:r>
+              <a:rPr lang="en-US" sz="1200" dirty="0" err="1">
+                <a:effectLst/>
+                <a:latin typeface="+mn-lt"/>
+              </a:rPr>
+              <a:t>aktuální</a:t>
+            </a:r>
+            <a:r>
+              <a:rPr lang="en-US" sz="1200" dirty="0">
+                <a:effectLst/>
+                <a:latin typeface="+mn-lt"/>
+              </a:rPr>
+              <a:t> </a:t>
+            </a:r>
+            <a:r>
+              <a:rPr lang="en-US" sz="1200" dirty="0" err="1">
+                <a:effectLst/>
+                <a:latin typeface="+mn-lt"/>
+              </a:rPr>
+              <a:t>znění</a:t>
+            </a:r>
+            <a:endParaRPr lang="en-US" sz="1200" dirty="0">
+              <a:effectLst/>
+              <a:latin typeface="+mn-lt"/>
+            </a:endParaRPr>
+          </a:p>
+          <a:p>
+            <a:endParaRPr lang="en-US" sz="1200" dirty="0">
+              <a:ea typeface="+mn-lt"/>
+              <a:cs typeface="+mn-lt"/>
+            </a:endParaRPr>
+          </a:p>
+          <a:p>
+            <a:endParaRPr lang="cs-CZ" sz="1200" dirty="0">
+              <a:ea typeface="+mn-lt"/>
+              <a:cs typeface="+mn-lt"/>
+            </a:endParaRPr>
+          </a:p>
+        </p:txBody>
+      </p:sp>
+    </p:spTree>
+    <p:extLst>
+      <p:ext uri="{BB962C8B-B14F-4D97-AF65-F5344CB8AC3E}">
+        <p14:creationId xmlns:p14="http://schemas.microsoft.com/office/powerpoint/2010/main" val="1594678827"/>
+      </p:ext>
+    </p:extLst>
+  </p:cSld>
+  <p:clrMapOvr>
+    <a:masterClrMapping/>
+  </p:clrMapOvr>
+</p:sld>
+</file>
+
 <file path=ppt/slides/slide2.xml><?xml version="1.0" encoding="utf-8"?>
 <p:sld xmlns:a="http://schemas.openxmlformats.org/drawingml/2006/main" xmlns:r="http://schemas.openxmlformats.org/officeDocument/2006/relationships" xmlns:p="http://schemas.openxmlformats.org/presentationml/2006/main">
   <p:cSld>
@@ -1973,6 +2355,18 @@
             </a:r>
           </a:p>
           <a:p>
+            <a:r>
+              <a:rPr lang="en-US" dirty="0" err="1">
+                <a:cs typeface="Calibri"/>
+              </a:rPr>
+              <a:t>Shrnut</a:t>
+            </a:r>
+            <a:r>
+              <a:rPr lang="cs-CZ" dirty="0">
+                <a:cs typeface="Calibri"/>
+              </a:rPr>
+              <a:t>í </a:t>
+            </a:r>
             <a:endParaRPr lang="en-US" dirty="0">
               <a:cs typeface="Calibri"/>
             </a:endParaRPr>
@@ -2436,7 +2830,15 @@
               <a:rPr lang="cs-CZ" dirty="0">
                 <a:latin typeface="+mn-lt"/>
               </a:rPr>
-              <a:t>kritické prvky infrastruktury</a:t>
+              <a:t>kritické prvky infrastruktury.</a:t>
+            </a:r>
+          </a:p>
+          <a:p>
+            <a:r>
+              <a:rPr lang="cs-CZ" dirty="0">
+                <a:latin typeface="+mn-lt"/>
+              </a:rPr>
+              <a:t>Určuje také ochranu osobních informací</a:t>
             </a:r>
           </a:p>
           <a:p>
@@ -2703,7 +3105,7 @@
           <p:cNvPr id="2" name="Nadpis 1">
             <a:extLst>
               <a:ext uri="{FF2B5EF4-FFF2-40B4-BE49-F238E27FC236}">
-                <a16:creationId xmlns:a16="http://schemas.microsoft.com/office/drawing/2014/main" id="{F91DE7B1-1ACE-422B-A98B-2BF1A9EDED73}"/>
+                <a16:creationId xmlns:a16="http://schemas.microsoft.com/office/drawing/2014/main" id="{7062C0A2-ED94-7AAC-3318-6A600B0E9357}"/>
               </a:ext>
             </a:extLst>
           </p:cNvPr>
@@ -2714,29 +3116,52 @@
             <p:ph type="title"/>
           </p:nvPr>
         </p:nvSpPr>
-        <p:spPr>
-          <a:xfrm>
-            <a:off x="3449637" y="2762250"/>
-            <a:ext cx="10515600" cy="1325563"/>
-          </a:xfrm>
-        </p:spPr>
+        <p:spPr/>
         <p:txBody>
           <a:bodyPr/>
           <a:lstStyle/>
           <a:p>
             <a:r>
-              <a:rPr lang="cs-CZ" dirty="0">
-                <a:cs typeface="Calibri Light"/>
-              </a:rPr>
-              <a:t>Děkuji za pozornost!</a:t>
-            </a:r>
+              <a:rPr lang="cs-CZ" dirty="0"/>
+              <a:t>Právní odpovědnost uživatele výpočetní techniky</a:t>
+            </a:r>
+            <a:endParaRPr lang="en-US" dirty="0"/>
+          </a:p>
+        </p:txBody>
+      </p:sp>
+      <p:sp>
+        <p:nvSpPr>
+          <p:cNvPr id="3" name="Zástupný obsah 2">
+            <a:extLst>
+              <a:ext uri="{FF2B5EF4-FFF2-40B4-BE49-F238E27FC236}">
+                <a16:creationId xmlns:a16="http://schemas.microsoft.com/office/drawing/2014/main" id="{640FB8D1-3F44-7D96-DD62-C5891E0A69CB}"/>
+              </a:ext>
+            </a:extLst>
+          </p:cNvPr>
+          <p:cNvSpPr>
+            <a:spLocks noGrp="1"/>
+          </p:cNvSpPr>
+          <p:nvPr>
+            <p:ph idx="1"/>
+          </p:nvPr>
+        </p:nvSpPr>
+        <p:spPr/>
+        <p:txBody>
+          <a:bodyPr/>
+          <a:lstStyle/>
+          <a:p>
+            <a:r>
+              <a:rPr lang="cs-CZ" dirty="0"/>
+              <a:t>Ochrana osobních údajů</a:t>
+            </a:r>
+            <a:endParaRPr lang="en-US" dirty="0"/>
           </a:p>
         </p:txBody>
       </p:sp>
     </p:spTree>
     <p:extLst>
       <p:ext uri="{BB962C8B-B14F-4D97-AF65-F5344CB8AC3E}">
-        <p14:creationId xmlns:p14="http://schemas.microsoft.com/office/powerpoint/2010/main" val="3347645221"/>
+        <p14:creationId xmlns:p14="http://schemas.microsoft.com/office/powerpoint/2010/main" val="1121253547"/>
       </p:ext>
     </p:extLst>
   </p:cSld>
@@ -2768,7 +3193,7 @@
           <p:cNvPr id="2" name="Nadpis 1">
             <a:extLst>
               <a:ext uri="{FF2B5EF4-FFF2-40B4-BE49-F238E27FC236}">
-                <a16:creationId xmlns:a16="http://schemas.microsoft.com/office/drawing/2014/main" id="{4AD65151-25F6-4CAA-8F2F-583CC6D94A46}"/>
+                <a16:creationId xmlns:a16="http://schemas.microsoft.com/office/drawing/2014/main" id="{F91DE7B1-1ACE-422B-A98B-2BF1A9EDED73}"/>
               </a:ext>
             </a:extLst>
           </p:cNvPr>
@@ -2779,345 +3204,29 @@
             <p:ph type="title"/>
           </p:nvPr>
         </p:nvSpPr>
-        <p:spPr/>
+        <p:spPr>
+          <a:xfrm>
+            <a:off x="3449637" y="2762250"/>
+            <a:ext cx="10515600" cy="1325563"/>
+          </a:xfrm>
+        </p:spPr>
         <p:txBody>
           <a:bodyPr/>
           <a:lstStyle/>
           <a:p>
             <a:r>
-              <a:rPr lang="cs-CZ">
+              <a:rPr lang="cs-CZ" dirty="0">
                 <a:cs typeface="Calibri Light"/>
               </a:rPr>
-              <a:t>Zdroje</a:t>
-            </a:r>
-          </a:p>
-        </p:txBody>
-      </p:sp>
-      <p:sp>
-        <p:nvSpPr>
-          <p:cNvPr id="3" name="Zástupný obsah 2">
-            <a:extLst>
-              <a:ext uri="{FF2B5EF4-FFF2-40B4-BE49-F238E27FC236}">
-                <a16:creationId xmlns:a16="http://schemas.microsoft.com/office/drawing/2014/main" id="{53BD2864-2797-45C9-BA46-310944DCC4E3}"/>
-              </a:ext>
-            </a:extLst>
-          </p:cNvPr>
-          <p:cNvSpPr>
-            <a:spLocks noGrp="1"/>
-          </p:cNvSpPr>
-          <p:nvPr>
-            <p:ph idx="1"/>
-          </p:nvPr>
-        </p:nvSpPr>
-        <p:spPr/>
-        <p:txBody>
-          <a:bodyPr vert="horz" lIns="91440" tIns="45720" rIns="91440" bIns="45720" rtlCol="0" anchor="t">
-            <a:normAutofit/>
-          </a:bodyPr>
-          <a:lstStyle/>
-          <a:p>
-            <a:r>
-              <a:rPr lang="cs-CZ" sz="1200" dirty="0">
-                <a:ea typeface="+mn-lt"/>
-                <a:cs typeface="+mn-lt"/>
-              </a:rPr>
-              <a:t>https://www.policie.cz/</a:t>
-            </a:r>
-            <a:r>
-              <a:rPr lang="cs-CZ" sz="1200" dirty="0" err="1">
-                <a:ea typeface="+mn-lt"/>
-                <a:cs typeface="+mn-lt"/>
-              </a:rPr>
-              <a:t>clanek</a:t>
-            </a:r>
-            <a:r>
-              <a:rPr lang="cs-CZ" sz="1200" dirty="0">
-                <a:ea typeface="+mn-lt"/>
-                <a:cs typeface="+mn-lt"/>
-              </a:rPr>
-              <a:t>/jednotlive-druhy-kyberkriminality.aspx#:~:text=Neopr%C3%A1vn%C4%9Bn%C3%BD%20p%C5%99%C3%ADstup%20k%20po%C4%8D%C3%ADta%C4%8Dov%C3%A9mu%20syst%C3%A9mu,neposledn%C3%AD%20%C5%99ad%C4%9B%20i%20zneu%C5%BE%C3%ADv%C3%A1n%C3%AD%20za%C5%99%C3%ADzen%C3%AD.</a:t>
-            </a:r>
-          </a:p>
-          <a:p>
-            <a:r>
-              <a:rPr lang="en-US" sz="1200" dirty="0">
-                <a:ea typeface="+mn-lt"/>
-                <a:cs typeface="+mn-lt"/>
-              </a:rPr>
-              <a:t>https://www.centrumlidskaprava.cz/blog/moznost-pripojit-se-k-internetu-jako-lidske-pravo</a:t>
-            </a:r>
-            <a:endParaRPr lang="cs-CZ" sz="1200" dirty="0">
-              <a:ea typeface="+mn-lt"/>
-              <a:cs typeface="+mn-lt"/>
-            </a:endParaRPr>
-          </a:p>
-          <a:p>
-            <a:endParaRPr lang="en-US" sz="1200" dirty="0">
-              <a:ea typeface="+mn-lt"/>
-              <a:cs typeface="+mn-lt"/>
-            </a:endParaRPr>
-          </a:p>
-          <a:p>
-            <a:r>
-              <a:rPr lang="en-US" sz="1200" dirty="0" err="1">
-                <a:effectLst/>
-                <a:latin typeface="+mn-lt"/>
-              </a:rPr>
-              <a:t>Seznam</a:t>
-            </a:r>
-            <a:r>
-              <a:rPr lang="en-US" sz="1200" dirty="0">
-                <a:effectLst/>
-                <a:latin typeface="+mn-lt"/>
-              </a:rPr>
-              <a:t> </a:t>
-            </a:r>
-            <a:r>
-              <a:rPr lang="en-US" sz="1200" dirty="0" err="1">
-                <a:effectLst/>
-                <a:latin typeface="+mn-lt"/>
-              </a:rPr>
-              <a:t>odborné</a:t>
-            </a:r>
-            <a:r>
-              <a:rPr lang="en-US" sz="1200" dirty="0">
-                <a:effectLst/>
-                <a:latin typeface="+mn-lt"/>
-              </a:rPr>
-              <a:t> </a:t>
-            </a:r>
-            <a:r>
-              <a:rPr lang="en-US" sz="1200" dirty="0" err="1">
-                <a:effectLst/>
-                <a:latin typeface="+mn-lt"/>
-              </a:rPr>
-              <a:t>literatury</a:t>
-            </a:r>
-            <a:r>
-              <a:rPr lang="en-US" sz="1200" dirty="0">
-                <a:effectLst/>
-                <a:latin typeface="+mn-lt"/>
-              </a:rPr>
-              <a:t>:</a:t>
-            </a:r>
-            <a:br>
-              <a:rPr lang="en-US" sz="1200" dirty="0">
-                <a:effectLst/>
-                <a:latin typeface="+mn-lt"/>
-              </a:rPr>
-            </a:br>
-            <a:r>
-              <a:rPr lang="en-US" sz="1200" dirty="0">
-                <a:effectLst/>
-                <a:latin typeface="+mn-lt"/>
-              </a:rPr>
-              <a:t> &lt;</a:t>
-            </a:r>
-            <a:r>
-              <a:rPr lang="en-US" sz="1200" u="sng" dirty="0">
-                <a:effectLst/>
-                <a:latin typeface="+mn-lt"/>
-              </a:rPr>
-              <a:t>https://www.zakonyprolidi.cz/cs/2009-40</a:t>
-            </a:r>
-            <a:r>
-              <a:rPr lang="en-US" sz="1200" dirty="0">
-                <a:effectLst/>
-                <a:latin typeface="+mn-lt"/>
-              </a:rPr>
-              <a:t>&gt;  </a:t>
-            </a:r>
-            <a:r>
-              <a:rPr lang="en-US" sz="1200" dirty="0" err="1">
-                <a:effectLst/>
-                <a:latin typeface="+mn-lt"/>
-              </a:rPr>
-              <a:t>aktuální</a:t>
-            </a:r>
-            <a:r>
-              <a:rPr lang="en-US" sz="1200" dirty="0">
-                <a:effectLst/>
-                <a:latin typeface="+mn-lt"/>
-              </a:rPr>
-              <a:t> </a:t>
-            </a:r>
-            <a:r>
-              <a:rPr lang="en-US" sz="1200" dirty="0" err="1">
-                <a:effectLst/>
-                <a:latin typeface="+mn-lt"/>
-              </a:rPr>
-              <a:t>znění</a:t>
-            </a:r>
-            <a:endParaRPr lang="en-US" sz="1200" dirty="0">
-              <a:effectLst/>
-              <a:latin typeface="+mn-lt"/>
-            </a:endParaRPr>
-          </a:p>
-          <a:p>
-            <a:r>
-              <a:rPr lang="en-US" sz="1200" dirty="0">
-                <a:effectLst/>
-                <a:latin typeface="+mn-lt"/>
-              </a:rPr>
-              <a:t> Jan </a:t>
-            </a:r>
-            <a:r>
-              <a:rPr lang="en-US" sz="1200" dirty="0" err="1">
-                <a:effectLst/>
-                <a:latin typeface="+mn-lt"/>
-              </a:rPr>
-              <a:t>Kolouch</a:t>
-            </a:r>
-            <a:r>
-              <a:rPr lang="en-US" sz="1200" dirty="0">
-                <a:effectLst/>
-                <a:latin typeface="+mn-lt"/>
-              </a:rPr>
-              <a:t> a </a:t>
-            </a:r>
-            <a:r>
-              <a:rPr lang="en-US" sz="1200" dirty="0" err="1">
-                <a:effectLst/>
-                <a:latin typeface="+mn-lt"/>
-              </a:rPr>
-              <a:t>kolektiv</a:t>
-            </a:r>
-            <a:r>
-              <a:rPr lang="en-US" sz="1200" dirty="0">
-                <a:effectLst/>
-                <a:latin typeface="+mn-lt"/>
-              </a:rPr>
-              <a:t>, "CYBERSECURITY", &lt;</a:t>
-            </a:r>
-            <a:r>
-              <a:rPr lang="en-US" sz="1200" u="sng" dirty="0">
-                <a:effectLst/>
-                <a:latin typeface="+mn-lt"/>
-              </a:rPr>
-              <a:t>https://knihy.nic.cz/files/edice/cybersecurity.pdf</a:t>
-            </a:r>
-            <a:r>
-              <a:rPr lang="en-US" sz="1200" dirty="0">
-                <a:effectLst/>
-                <a:latin typeface="+mn-lt"/>
-              </a:rPr>
-              <a:t>&gt;</a:t>
-            </a:r>
-          </a:p>
-          <a:p>
-            <a:r>
-              <a:rPr lang="en-US" sz="1200" dirty="0">
-                <a:effectLst/>
-                <a:latin typeface="+mn-lt"/>
-              </a:rPr>
-              <a:t> &lt;</a:t>
-            </a:r>
-            <a:r>
-              <a:rPr lang="en-US" sz="1200" u="sng" dirty="0">
-                <a:effectLst/>
-                <a:latin typeface="+mn-lt"/>
-              </a:rPr>
-              <a:t>https://www.nukib.cz/cs/</a:t>
-            </a:r>
-            <a:r>
-              <a:rPr lang="en-US" sz="1200" dirty="0">
-                <a:effectLst/>
-                <a:latin typeface="+mn-lt"/>
-              </a:rPr>
-              <a:t>&gt;, </a:t>
-            </a:r>
-            <a:r>
-              <a:rPr lang="en-US" sz="1200" dirty="0" err="1">
-                <a:effectLst/>
-                <a:latin typeface="+mn-lt"/>
-              </a:rPr>
-              <a:t>vzdělávací</a:t>
-            </a:r>
-            <a:r>
-              <a:rPr lang="en-US" sz="1200" dirty="0">
-                <a:effectLst/>
-                <a:latin typeface="+mn-lt"/>
-              </a:rPr>
-              <a:t> </a:t>
-            </a:r>
-            <a:r>
-              <a:rPr lang="en-US" sz="1200" dirty="0" err="1">
-                <a:effectLst/>
-                <a:latin typeface="+mn-lt"/>
-              </a:rPr>
-              <a:t>materiály</a:t>
-            </a:r>
-            <a:endParaRPr lang="en-US" sz="1200" dirty="0">
-              <a:effectLst/>
-              <a:latin typeface="+mn-lt"/>
-            </a:endParaRPr>
-          </a:p>
-          <a:p>
-            <a:r>
-              <a:rPr lang="en-US" sz="1200" dirty="0">
-                <a:effectLst/>
-                <a:latin typeface="+mn-lt"/>
-              </a:rPr>
-              <a:t> &lt;</a:t>
-            </a:r>
-            <a:r>
-              <a:rPr lang="en-US" sz="1200" u="sng" dirty="0">
-                <a:effectLst/>
-                <a:latin typeface="+mn-lt"/>
-              </a:rPr>
-              <a:t>https://www.zakonyprolidi.cz/cs/2014-181</a:t>
-            </a:r>
-            <a:r>
-              <a:rPr lang="en-US" sz="1200" dirty="0">
-                <a:effectLst/>
-                <a:latin typeface="+mn-lt"/>
-              </a:rPr>
-              <a:t>&gt; </a:t>
-            </a:r>
-            <a:r>
-              <a:rPr lang="en-US" sz="1200" dirty="0" err="1">
-                <a:effectLst/>
-                <a:latin typeface="+mn-lt"/>
-              </a:rPr>
-              <a:t>aktuální</a:t>
-            </a:r>
-            <a:r>
-              <a:rPr lang="en-US" sz="1200" dirty="0">
-                <a:effectLst/>
-                <a:latin typeface="+mn-lt"/>
-              </a:rPr>
-              <a:t> </a:t>
-            </a:r>
-            <a:r>
-              <a:rPr lang="en-US" sz="1200" dirty="0" err="1">
-                <a:effectLst/>
-                <a:latin typeface="+mn-lt"/>
-              </a:rPr>
-              <a:t>znění</a:t>
-            </a:r>
-            <a:endParaRPr lang="en-US" sz="1200" dirty="0">
-              <a:effectLst/>
-              <a:latin typeface="+mn-lt"/>
-            </a:endParaRPr>
-          </a:p>
-          <a:p>
-            <a:endParaRPr lang="en-US" sz="1200" dirty="0">
-              <a:ea typeface="+mn-lt"/>
-              <a:cs typeface="+mn-lt"/>
-            </a:endParaRPr>
-          </a:p>
-          <a:p>
-            <a:endParaRPr lang="cs-CZ" sz="1200" dirty="0">
-              <a:ea typeface="+mn-lt"/>
-              <a:cs typeface="+mn-lt"/>
-            </a:endParaRPr>
+              <a:t>Děkuji za pozornost!</a:t>
+            </a:r>
           </a:p>
         </p:txBody>
       </p:sp>
     </p:spTree>
     <p:extLst>
       <p:ext uri="{BB962C8B-B14F-4D97-AF65-F5344CB8AC3E}">
-        <p14:creationId xmlns:p14="http://schemas.microsoft.com/office/powerpoint/2010/main" val="1594678827"/>
+        <p14:creationId xmlns:p14="http://schemas.microsoft.com/office/powerpoint/2010/main" val="3347645221"/>
       </p:ext>
     </p:extLst>
   </p:cSld>

</xml_diff>

<commit_message>
last commit before my ride to my execution
</commit_message>
<xml_diff>
--- a/Kochanek_projekt_II_it_use_liability.pptx
+++ b/Kochanek_projekt_II_it_use_liability.pptx
@@ -220,7 +220,7 @@
           <a:p>
             <a:fld id="{BBE73205-81ED-456F-9C45-E7D4927D1E88}" type="datetimeFigureOut">
               <a:rPr lang="cs-CZ" smtClean="0"/>
-              <a:t>01.06.2022</a:t>
+              <a:t>02.06.2022</a:t>
             </a:fld>
             <a:endParaRPr lang="cs-CZ"/>
           </a:p>
@@ -2353,20 +2353,6 @@
               </a:rPr>
               <a:t>Právní odpovědnost s připojením k internetu</a:t>
             </a:r>
-          </a:p>
-          <a:p>
-            <a:r>
-              <a:rPr lang="en-US" dirty="0" err="1">
-                <a:cs typeface="Calibri"/>
-              </a:rPr>
-              <a:t>Shrnut</a:t>
-            </a:r>
-            <a:r>
-              <a:rPr lang="cs-CZ" dirty="0">
-                <a:cs typeface="Calibri"/>
-              </a:rPr>
-              <a:t>í </a:t>
-            </a:r>
             <a:endParaRPr lang="en-US" dirty="0">
               <a:cs typeface="Calibri"/>
             </a:endParaRPr>
@@ -3123,7 +3109,7 @@
           <a:p>
             <a:r>
               <a:rPr lang="cs-CZ" dirty="0"/>
-              <a:t>Právní odpovědnost uživatele výpočetní techniky</a:t>
+              <a:t>Závěry</a:t>
             </a:r>
             <a:endParaRPr lang="en-US" dirty="0"/>
           </a:p>
@@ -3152,7 +3138,7 @@
           <a:p>
             <a:r>
               <a:rPr lang="cs-CZ" dirty="0"/>
-              <a:t>Ochrana osobních údajů</a:t>
+              <a:t>Dle trestního zákoníku uvedené </a:t>
             </a:r>
             <a:endParaRPr lang="en-US" dirty="0"/>
           </a:p>

</xml_diff>